<commit_message>
After refactor menuheader and searchbar
</commit_message>
<xml_diff>
--- a/Data Model.pptx
+++ b/Data Model.pptx
@@ -104,6 +104,11 @@
       </a:defRPr>
     </a:lvl9pPr>
   </p:defaultTextStyle>
+  <p:extLst>
+    <p:ext uri="{EFAFB233-063F-42B5-8137-9DF3F51BA10A}">
+      <p15:sldGuideLst xmlns:p15="http://schemas.microsoft.com/office/powerpoint/2012/main"/>
+    </p:ext>
+  </p:extLst>
 </p:presentation>
 </file>
 
@@ -254,7 +259,7 @@
           <a:p>
             <a:fld id="{98A85023-D9DD-4A64-A6A0-A4C20F8909B2}" type="datetimeFigureOut">
               <a:rPr lang="nl-NL" smtClean="0"/>
-              <a:t>18-12-2021</a:t>
+              <a:t>20-12-2021</a:t>
             </a:fld>
             <a:endParaRPr lang="nl-NL"/>
           </a:p>
@@ -452,7 +457,7 @@
           <a:p>
             <a:fld id="{98A85023-D9DD-4A64-A6A0-A4C20F8909B2}" type="datetimeFigureOut">
               <a:rPr lang="nl-NL" smtClean="0"/>
-              <a:t>18-12-2021</a:t>
+              <a:t>20-12-2021</a:t>
             </a:fld>
             <a:endParaRPr lang="nl-NL"/>
           </a:p>
@@ -660,7 +665,7 @@
           <a:p>
             <a:fld id="{98A85023-D9DD-4A64-A6A0-A4C20F8909B2}" type="datetimeFigureOut">
               <a:rPr lang="nl-NL" smtClean="0"/>
-              <a:t>18-12-2021</a:t>
+              <a:t>20-12-2021</a:t>
             </a:fld>
             <a:endParaRPr lang="nl-NL"/>
           </a:p>
@@ -858,7 +863,7 @@
           <a:p>
             <a:fld id="{98A85023-D9DD-4A64-A6A0-A4C20F8909B2}" type="datetimeFigureOut">
               <a:rPr lang="nl-NL" smtClean="0"/>
-              <a:t>18-12-2021</a:t>
+              <a:t>20-12-2021</a:t>
             </a:fld>
             <a:endParaRPr lang="nl-NL"/>
           </a:p>
@@ -1133,7 +1138,7 @@
           <a:p>
             <a:fld id="{98A85023-D9DD-4A64-A6A0-A4C20F8909B2}" type="datetimeFigureOut">
               <a:rPr lang="nl-NL" smtClean="0"/>
-              <a:t>18-12-2021</a:t>
+              <a:t>20-12-2021</a:t>
             </a:fld>
             <a:endParaRPr lang="nl-NL"/>
           </a:p>
@@ -1398,7 +1403,7 @@
           <a:p>
             <a:fld id="{98A85023-D9DD-4A64-A6A0-A4C20F8909B2}" type="datetimeFigureOut">
               <a:rPr lang="nl-NL" smtClean="0"/>
-              <a:t>18-12-2021</a:t>
+              <a:t>20-12-2021</a:t>
             </a:fld>
             <a:endParaRPr lang="nl-NL"/>
           </a:p>
@@ -1810,7 +1815,7 @@
           <a:p>
             <a:fld id="{98A85023-D9DD-4A64-A6A0-A4C20F8909B2}" type="datetimeFigureOut">
               <a:rPr lang="nl-NL" smtClean="0"/>
-              <a:t>18-12-2021</a:t>
+              <a:t>20-12-2021</a:t>
             </a:fld>
             <a:endParaRPr lang="nl-NL"/>
           </a:p>
@@ -1951,7 +1956,7 @@
           <a:p>
             <a:fld id="{98A85023-D9DD-4A64-A6A0-A4C20F8909B2}" type="datetimeFigureOut">
               <a:rPr lang="nl-NL" smtClean="0"/>
-              <a:t>18-12-2021</a:t>
+              <a:t>20-12-2021</a:t>
             </a:fld>
             <a:endParaRPr lang="nl-NL"/>
           </a:p>
@@ -2064,7 +2069,7 @@
           <a:p>
             <a:fld id="{98A85023-D9DD-4A64-A6A0-A4C20F8909B2}" type="datetimeFigureOut">
               <a:rPr lang="nl-NL" smtClean="0"/>
-              <a:t>18-12-2021</a:t>
+              <a:t>20-12-2021</a:t>
             </a:fld>
             <a:endParaRPr lang="nl-NL"/>
           </a:p>
@@ -2375,7 +2380,7 @@
           <a:p>
             <a:fld id="{98A85023-D9DD-4A64-A6A0-A4C20F8909B2}" type="datetimeFigureOut">
               <a:rPr lang="nl-NL" smtClean="0"/>
-              <a:t>18-12-2021</a:t>
+              <a:t>20-12-2021</a:t>
             </a:fld>
             <a:endParaRPr lang="nl-NL"/>
           </a:p>
@@ -2663,7 +2668,7 @@
           <a:p>
             <a:fld id="{98A85023-D9DD-4A64-A6A0-A4C20F8909B2}" type="datetimeFigureOut">
               <a:rPr lang="nl-NL" smtClean="0"/>
-              <a:t>18-12-2021</a:t>
+              <a:t>20-12-2021</a:t>
             </a:fld>
             <a:endParaRPr lang="nl-NL"/>
           </a:p>
@@ -2904,7 +2909,7 @@
           <a:p>
             <a:fld id="{98A85023-D9DD-4A64-A6A0-A4C20F8909B2}" type="datetimeFigureOut">
               <a:rPr lang="nl-NL" smtClean="0"/>
-              <a:t>18-12-2021</a:t>
+              <a:t>20-12-2021</a:t>
             </a:fld>
             <a:endParaRPr lang="nl-NL"/>
           </a:p>
@@ -3364,21 +3369,21 @@
           <a:p>
             <a:pPr algn="ctr"/>
             <a:r>
-              <a:rPr lang="nl-NL" dirty="0"/>
+              <a:rPr lang="nl-NL" sz="1100" dirty="0"/>
               <a:t>Offer</a:t>
             </a:r>
           </a:p>
           <a:p>
             <a:pPr algn="ctr"/>
             <a:r>
-              <a:rPr lang="nl-NL" dirty="0"/>
+              <a:rPr lang="nl-NL" sz="1100" dirty="0"/>
               <a:t>Type</a:t>
             </a:r>
           </a:p>
           <a:p>
             <a:pPr algn="ctr"/>
             <a:r>
-              <a:rPr lang="nl-NL" dirty="0"/>
+              <a:rPr lang="nl-NL" sz="1100" dirty="0"/>
               <a:t>periode</a:t>
             </a:r>
           </a:p>
@@ -3398,8 +3403,8 @@
         </p:nvSpPr>
         <p:spPr>
           <a:xfrm>
-            <a:off x="1325460" y="3340217"/>
-            <a:ext cx="2315362" cy="1317071"/>
+            <a:off x="1325460" y="3074886"/>
+            <a:ext cx="2315362" cy="2113063"/>
           </a:xfrm>
           <a:prstGeom prst="rect">
             <a:avLst/>
@@ -3427,31 +3432,89 @@
           <a:p>
             <a:pPr algn="ctr"/>
             <a:r>
-              <a:rPr lang="nl-NL" dirty="0"/>
+              <a:rPr lang="nl-NL" sz="900" dirty="0"/>
               <a:t>Product</a:t>
             </a:r>
           </a:p>
           <a:p>
             <a:pPr algn="ctr"/>
             <a:r>
-              <a:rPr lang="nl-NL" dirty="0" err="1"/>
+              <a:rPr lang="nl-NL" sz="900" dirty="0" err="1"/>
               <a:t>Id</a:t>
             </a:r>
-            <a:endParaRPr lang="nl-NL" dirty="0"/>
+            <a:endParaRPr lang="nl-NL" sz="900" dirty="0"/>
           </a:p>
           <a:p>
             <a:pPr algn="ctr"/>
             <a:r>
-              <a:rPr lang="nl-NL" dirty="0"/>
-              <a:t>Omschrijving</a:t>
-            </a:r>
-          </a:p>
-          <a:p>
-            <a:pPr algn="ctr"/>
-            <a:r>
-              <a:rPr lang="nl-NL" dirty="0"/>
-              <a:t>afbeelding</a:t>
-            </a:r>
+              <a:rPr lang="nl-NL" sz="900" dirty="0"/>
+              <a:t>(</a:t>
+            </a:r>
+            <a:r>
+              <a:rPr lang="nl-NL" sz="900" dirty="0" err="1"/>
+              <a:t>rating_id</a:t>
+            </a:r>
+            <a:r>
+              <a:rPr lang="nl-NL" sz="900" dirty="0"/>
+              <a:t>)</a:t>
+            </a:r>
+          </a:p>
+          <a:p>
+            <a:r>
+              <a:rPr lang="nl-NL" sz="900" i="1" dirty="0"/>
+              <a:t>@</a:t>
+            </a:r>
+            <a:r>
+              <a:rPr lang="nl-NL" sz="900" i="1" dirty="0" err="1"/>
+              <a:t>OneToOne</a:t>
+            </a:r>
+            <a:r>
+              <a:rPr lang="nl-NL" sz="900" i="1" dirty="0"/>
+              <a:t>(cascade = </a:t>
+            </a:r>
+            <a:r>
+              <a:rPr lang="nl-NL" sz="900" i="1" dirty="0" err="1"/>
+              <a:t>CascadeType.</a:t>
+            </a:r>
+            <a:r>
+              <a:rPr lang="nl-NL" sz="900" b="1" i="1" dirty="0" err="1"/>
+              <a:t>ALL</a:t>
+            </a:r>
+            <a:r>
+              <a:rPr lang="nl-NL" sz="900" b="1" i="1" dirty="0"/>
+              <a:t>)</a:t>
+            </a:r>
+          </a:p>
+          <a:p>
+            <a:r>
+              <a:rPr lang="en-US" sz="900" i="1" dirty="0"/>
+              <a:t>@</a:t>
+            </a:r>
+            <a:r>
+              <a:rPr lang="en-US" sz="900" i="1" dirty="0" err="1"/>
+              <a:t>JoinColumn</a:t>
+            </a:r>
+            <a:r>
+              <a:rPr lang="en-US" sz="900" i="1" dirty="0"/>
+              <a:t> (name="</a:t>
+            </a:r>
+            <a:r>
+              <a:rPr lang="en-US" sz="900" i="1" dirty="0" err="1"/>
+              <a:t>rating_id</a:t>
+            </a:r>
+            <a:r>
+              <a:rPr lang="en-US" sz="900" i="1" dirty="0"/>
+              <a:t>", </a:t>
+            </a:r>
+            <a:r>
+              <a:rPr lang="en-US" sz="900" i="1" dirty="0" err="1"/>
+              <a:t>referencedColumnName</a:t>
+            </a:r>
+            <a:r>
+              <a:rPr lang="en-US" sz="900" i="1" dirty="0"/>
+              <a:t>="id") </a:t>
+            </a:r>
+            <a:endParaRPr lang="nl-NL" sz="900" dirty="0"/>
           </a:p>
         </p:txBody>
       </p:sp>
@@ -3465,15 +3528,15 @@
             </a:extLst>
           </p:cNvPr>
           <p:cNvCxnSpPr>
+            <a:cxnSpLocks/>
             <a:stCxn id="4" idx="2"/>
-            <a:endCxn id="5" idx="0"/>
           </p:cNvCxnSpPr>
           <p:nvPr/>
         </p:nvCxnSpPr>
         <p:spPr>
           <a:xfrm>
             <a:off x="2483141" y="2751589"/>
-            <a:ext cx="0" cy="588628"/>
+            <a:ext cx="0" cy="323297"/>
           </a:xfrm>
           <a:prstGeom prst="straightConnector1">
             <a:avLst/>
@@ -3540,10 +3603,10 @@
           <a:p>
             <a:pPr algn="ctr"/>
             <a:r>
-              <a:rPr lang="nl-NL" dirty="0" err="1"/>
+              <a:rPr lang="nl-NL" sz="1100" dirty="0" err="1"/>
               <a:t>Recipe</a:t>
             </a:r>
-            <a:endParaRPr lang="nl-NL" dirty="0"/>
+            <a:endParaRPr lang="nl-NL" sz="1100" dirty="0"/>
           </a:p>
         </p:txBody>
       </p:sp>
@@ -3590,10 +3653,10 @@
           <a:p>
             <a:pPr algn="ctr"/>
             <a:r>
-              <a:rPr lang="nl-NL" dirty="0" err="1"/>
+              <a:rPr lang="nl-NL" sz="1100" dirty="0" err="1"/>
               <a:t>Product_Recipe</a:t>
             </a:r>
-            <a:endParaRPr lang="nl-NL" dirty="0"/>
+            <a:endParaRPr lang="nl-NL" sz="1100" dirty="0"/>
           </a:p>
         </p:txBody>
       </p:sp>
@@ -3657,7 +3720,7 @@
         <p:spPr>
           <a:xfrm flipV="1">
             <a:off x="3640822" y="3998752"/>
-            <a:ext cx="1605093" cy="1"/>
+            <a:ext cx="1605093" cy="132666"/>
           </a:xfrm>
           <a:prstGeom prst="straightConnector1">
             <a:avLst/>
@@ -3724,7 +3787,7 @@
           <a:p>
             <a:pPr algn="ctr"/>
             <a:r>
-              <a:rPr lang="nl-NL" dirty="0"/>
+              <a:rPr lang="nl-NL" sz="1100" dirty="0"/>
               <a:t>Rating</a:t>
             </a:r>
           </a:p>
@@ -3748,8 +3811,8 @@
         </p:nvCxnSpPr>
         <p:spPr>
           <a:xfrm>
-            <a:off x="2483141" y="4657288"/>
-            <a:ext cx="0" cy="843794"/>
+            <a:off x="2483141" y="5187949"/>
+            <a:ext cx="0" cy="313133"/>
           </a:xfrm>
           <a:prstGeom prst="line">
             <a:avLst/>

</xml_diff>